<commit_message>
- updated Presentation. Renamed Prototypes to Platforms and added Windows Phone
</commit_message>
<xml_diff>
--- a/2nd_sem/daps/grill_murrent_lehner/DAPS.pptx
+++ b/2nd_sem/daps/grill_murrent_lehner/DAPS.pptx
@@ -113,6 +113,22 @@
       </a:defRPr>
     </a:lvl9pPr>
   </p:defaultTextStyle>
+  <p:extLst>
+    <p:ext uri="{EFAFB233-063F-42B5-8137-9DF3F51BA10A}">
+      <p15:sldGuideLst xmlns:p15="http://schemas.microsoft.com/office/powerpoint/2012/main">
+        <p15:guide id="1" orient="horz" pos="2160">
+          <p15:clr>
+            <a:srgbClr val="A4A3A4"/>
+          </p15:clr>
+        </p15:guide>
+        <p15:guide id="2" pos="2880">
+          <p15:clr>
+            <a:srgbClr val="A4A3A4"/>
+          </p15:clr>
+        </p15:guide>
+      </p15:sldGuideLst>
+    </p:ext>
+  </p:extLst>
 </p:presentation>
 </file>
 
@@ -303,7 +319,7 @@
           <a:p>
             <a:fld id="{1BA50D42-C9CD-4801-B293-61D1F53EC57E}" type="datetimeFigureOut">
               <a:rPr lang="de-DE" smtClean="0"/>
-              <a:t>25.06.2014</a:t>
+              <a:t>09.10.2014</a:t>
             </a:fld>
             <a:endParaRPr lang="de-DE"/>
           </a:p>
@@ -326,7 +342,7 @@
           <a:p>
             <a:fld id="{6C6AE60A-B69C-4790-82F7-3882EDF23186}" type="slidenum">
               <a:rPr lang="de-DE" smtClean="0"/>
-              <a:t>‹Nr.›</a:t>
+              <a:t>‹#›</a:t>
             </a:fld>
             <a:endParaRPr lang="de-DE"/>
           </a:p>
@@ -475,7 +491,7 @@
           <a:p>
             <a:fld id="{1BA50D42-C9CD-4801-B293-61D1F53EC57E}" type="datetimeFigureOut">
               <a:rPr lang="de-DE" smtClean="0"/>
-              <a:t>25.06.2014</a:t>
+              <a:t>09.10.2014</a:t>
             </a:fld>
             <a:endParaRPr lang="de-DE"/>
           </a:p>
@@ -517,7 +533,7 @@
           <a:p>
             <a:fld id="{6C6AE60A-B69C-4790-82F7-3882EDF23186}" type="slidenum">
               <a:rPr lang="de-DE" smtClean="0"/>
-              <a:t>‹Nr.›</a:t>
+              <a:t>‹#›</a:t>
             </a:fld>
             <a:endParaRPr lang="de-DE"/>
           </a:p>
@@ -650,7 +666,7 @@
           <a:p>
             <a:fld id="{1BA50D42-C9CD-4801-B293-61D1F53EC57E}" type="datetimeFigureOut">
               <a:rPr lang="de-DE" smtClean="0"/>
-              <a:t>25.06.2014</a:t>
+              <a:t>09.10.2014</a:t>
             </a:fld>
             <a:endParaRPr lang="de-DE"/>
           </a:p>
@@ -692,7 +708,7 @@
           <a:p>
             <a:fld id="{6C6AE60A-B69C-4790-82F7-3882EDF23186}" type="slidenum">
               <a:rPr lang="de-DE" smtClean="0"/>
-              <a:t>‹Nr.›</a:t>
+              <a:t>‹#›</a:t>
             </a:fld>
             <a:endParaRPr lang="de-DE"/>
           </a:p>
@@ -815,7 +831,7 @@
           <a:p>
             <a:fld id="{1BA50D42-C9CD-4801-B293-61D1F53EC57E}" type="datetimeFigureOut">
               <a:rPr lang="de-DE" smtClean="0"/>
-              <a:t>25.06.2014</a:t>
+              <a:t>09.10.2014</a:t>
             </a:fld>
             <a:endParaRPr lang="de-DE"/>
           </a:p>
@@ -857,7 +873,7 @@
           <a:p>
             <a:fld id="{6C6AE60A-B69C-4790-82F7-3882EDF23186}" type="slidenum">
               <a:rPr lang="de-DE" smtClean="0"/>
-              <a:t>‹Nr.›</a:t>
+              <a:t>‹#›</a:t>
             </a:fld>
             <a:endParaRPr lang="de-DE"/>
           </a:p>
@@ -1054,7 +1070,7 @@
           <a:p>
             <a:fld id="{1BA50D42-C9CD-4801-B293-61D1F53EC57E}" type="datetimeFigureOut">
               <a:rPr lang="de-DE" smtClean="0"/>
-              <a:t>25.06.2014</a:t>
+              <a:t>09.10.2014</a:t>
             </a:fld>
             <a:endParaRPr lang="de-DE"/>
           </a:p>
@@ -1096,7 +1112,7 @@
           <a:p>
             <a:fld id="{6C6AE60A-B69C-4790-82F7-3882EDF23186}" type="slidenum">
               <a:rPr lang="de-DE" smtClean="0"/>
-              <a:t>‹Nr.›</a:t>
+              <a:t>‹#›</a:t>
             </a:fld>
             <a:endParaRPr lang="de-DE"/>
           </a:p>
@@ -1144,7 +1160,7 @@
           <a:p>
             <a:fld id="{1BA50D42-C9CD-4801-B293-61D1F53EC57E}" type="datetimeFigureOut">
               <a:rPr lang="de-DE" smtClean="0"/>
-              <a:t>25.06.2014</a:t>
+              <a:t>09.10.2014</a:t>
             </a:fld>
             <a:endParaRPr lang="de-DE"/>
           </a:p>
@@ -1186,7 +1202,7 @@
           <a:p>
             <a:fld id="{6C6AE60A-B69C-4790-82F7-3882EDF23186}" type="slidenum">
               <a:rPr lang="de-DE" smtClean="0"/>
-              <a:t>‹Nr.›</a:t>
+              <a:t>‹#›</a:t>
             </a:fld>
             <a:endParaRPr lang="de-DE"/>
           </a:p>
@@ -1518,7 +1534,7 @@
           <a:p>
             <a:fld id="{1BA50D42-C9CD-4801-B293-61D1F53EC57E}" type="datetimeFigureOut">
               <a:rPr lang="de-DE" smtClean="0"/>
-              <a:t>25.06.2014</a:t>
+              <a:t>09.10.2014</a:t>
             </a:fld>
             <a:endParaRPr lang="de-DE"/>
           </a:p>
@@ -1560,7 +1576,7 @@
           <a:p>
             <a:fld id="{6C6AE60A-B69C-4790-82F7-3882EDF23186}" type="slidenum">
               <a:rPr lang="de-DE" smtClean="0"/>
-              <a:t>‹Nr.›</a:t>
+              <a:t>‹#›</a:t>
             </a:fld>
             <a:endParaRPr lang="de-DE"/>
           </a:p>
@@ -1773,7 +1789,7 @@
           <a:p>
             <a:fld id="{1BA50D42-C9CD-4801-B293-61D1F53EC57E}" type="datetimeFigureOut">
               <a:rPr lang="de-DE" smtClean="0"/>
-              <a:t>25.06.2014</a:t>
+              <a:t>09.10.2014</a:t>
             </a:fld>
             <a:endParaRPr lang="de-DE"/>
           </a:p>
@@ -1815,7 +1831,7 @@
           <a:p>
             <a:fld id="{6C6AE60A-B69C-4790-82F7-3882EDF23186}" type="slidenum">
               <a:rPr lang="de-DE" smtClean="0"/>
-              <a:t>‹Nr.›</a:t>
+              <a:t>‹#›</a:t>
             </a:fld>
             <a:endParaRPr lang="de-DE"/>
           </a:p>
@@ -1863,7 +1879,7 @@
           <a:p>
             <a:fld id="{1BA50D42-C9CD-4801-B293-61D1F53EC57E}" type="datetimeFigureOut">
               <a:rPr lang="de-DE" smtClean="0"/>
-              <a:t>25.06.2014</a:t>
+              <a:t>09.10.2014</a:t>
             </a:fld>
             <a:endParaRPr lang="de-DE"/>
           </a:p>
@@ -1905,7 +1921,7 @@
           <a:p>
             <a:fld id="{6C6AE60A-B69C-4790-82F7-3882EDF23186}" type="slidenum">
               <a:rPr lang="de-DE" smtClean="0"/>
-              <a:t>‹Nr.›</a:t>
+              <a:t>‹#›</a:t>
             </a:fld>
             <a:endParaRPr lang="de-DE"/>
           </a:p>
@@ -2137,7 +2153,7 @@
           <a:p>
             <a:fld id="{1BA50D42-C9CD-4801-B293-61D1F53EC57E}" type="datetimeFigureOut">
               <a:rPr lang="de-DE" smtClean="0"/>
-              <a:t>25.06.2014</a:t>
+              <a:t>09.10.2014</a:t>
             </a:fld>
             <a:endParaRPr lang="de-DE"/>
           </a:p>
@@ -2179,7 +2195,7 @@
           <a:p>
             <a:fld id="{6C6AE60A-B69C-4790-82F7-3882EDF23186}" type="slidenum">
               <a:rPr lang="de-DE" smtClean="0"/>
-              <a:t>‹Nr.›</a:t>
+              <a:t>‹#›</a:t>
             </a:fld>
             <a:endParaRPr lang="de-DE"/>
           </a:p>
@@ -2409,7 +2425,7 @@
           <a:p>
             <a:fld id="{1BA50D42-C9CD-4801-B293-61D1F53EC57E}" type="datetimeFigureOut">
               <a:rPr lang="de-DE" smtClean="0"/>
-              <a:t>25.06.2014</a:t>
+              <a:t>09.10.2014</a:t>
             </a:fld>
             <a:endParaRPr lang="de-DE"/>
           </a:p>
@@ -2451,7 +2467,7 @@
           <a:p>
             <a:fld id="{6C6AE60A-B69C-4790-82F7-3882EDF23186}" type="slidenum">
               <a:rPr lang="de-DE" smtClean="0"/>
-              <a:t>‹Nr.›</a:t>
+              <a:t>‹#›</a:t>
             </a:fld>
             <a:endParaRPr lang="de-DE"/>
           </a:p>
@@ -2709,7 +2725,7 @@
           <a:p>
             <a:fld id="{1BA50D42-C9CD-4801-B293-61D1F53EC57E}" type="datetimeFigureOut">
               <a:rPr lang="de-DE" smtClean="0"/>
-              <a:t>25.06.2014</a:t>
+              <a:t>09.10.2014</a:t>
             </a:fld>
             <a:endParaRPr lang="de-DE"/>
           </a:p>
@@ -2748,7 +2764,7 @@
           <a:p>
             <a:fld id="{6C6AE60A-B69C-4790-82F7-3882EDF23186}" type="slidenum">
               <a:rPr lang="de-DE" smtClean="0"/>
-              <a:t>‹Nr.›</a:t>
+              <a:t>‹#›</a:t>
             </a:fld>
             <a:endParaRPr lang="de-DE"/>
           </a:p>
@@ -3417,9 +3433,10 @@
           </a:p>
           <a:p>
             <a:r>
-              <a:rPr lang="de-AT" dirty="0" smtClean="0"/>
-              <a:t>Prototypen</a:t>
-            </a:r>
+              <a:rPr lang="de-AT" dirty="0" err="1" smtClean="0"/>
+              <a:t>Platforms</a:t>
+            </a:r>
+            <a:endParaRPr lang="de-AT" dirty="0" smtClean="0"/>
           </a:p>
           <a:p>
             <a:endParaRPr lang="de-AT" dirty="0" smtClean="0"/>
@@ -5041,7 +5058,7 @@
           <a:p>
             <a:r>
               <a:rPr lang="de-AT" dirty="0" err="1" smtClean="0"/>
-              <a:t>Prototypes</a:t>
+              <a:t>Platforms</a:t>
             </a:r>
             <a:endParaRPr lang="de-AT" dirty="0"/>
           </a:p>
@@ -5062,12 +5079,9 @@
           <a:bodyPr/>
           <a:lstStyle/>
           <a:p>
-            <a:endParaRPr lang="de-AT" dirty="0" smtClean="0"/>
-          </a:p>
-          <a:p>
-            <a:endParaRPr lang="de-AT" dirty="0"/>
-          </a:p>
-          <a:p>
+            <a:pPr marL="45720" indent="0">
+              <a:buNone/>
+            </a:pPr>
             <a:endParaRPr lang="de-AT" dirty="0" smtClean="0"/>
           </a:p>
           <a:p>
@@ -5085,17 +5099,43 @@
             </a:r>
             <a:r>
               <a:rPr lang="de-AT" dirty="0" smtClean="0"/>
-              <a:t>) + TP-Link Nano TL-WN725N</a:t>
-            </a:r>
-          </a:p>
-          <a:p>
+              <a:t>) </a:t>
+            </a:r>
             <a:endParaRPr lang="de-AT" dirty="0"/>
           </a:p>
           <a:p>
+            <a:pPr lvl="1"/>
             <a:r>
               <a:rPr lang="de-AT" dirty="0" smtClean="0"/>
-              <a:t>Android 4.4/ 4.2</a:t>
-            </a:r>
+              <a:t>TP-Link </a:t>
+            </a:r>
+            <a:r>
+              <a:rPr lang="de-AT" dirty="0" smtClean="0"/>
+              <a:t>Nano TL-WN725N</a:t>
+            </a:r>
+          </a:p>
+          <a:p>
+            <a:endParaRPr lang="de-AT" dirty="0"/>
+          </a:p>
+          <a:p>
+            <a:r>
+              <a:rPr lang="de-AT" dirty="0" smtClean="0"/>
+              <a:t>Android 4.4/ </a:t>
+            </a:r>
+            <a:r>
+              <a:rPr lang="de-AT" dirty="0" smtClean="0"/>
+              <a:t>4.2</a:t>
+            </a:r>
+          </a:p>
+          <a:p>
+            <a:endParaRPr lang="de-AT" dirty="0"/>
+          </a:p>
+          <a:p>
+            <a:r>
+              <a:rPr lang="de-AT" dirty="0" smtClean="0"/>
+              <a:t>Windows Phone</a:t>
+            </a:r>
+            <a:endParaRPr lang="de-AT" dirty="0" smtClean="0"/>
           </a:p>
           <a:p>
             <a:endParaRPr lang="de-AT" dirty="0"/>

</xml_diff>

<commit_message>
- updated VUPS Presentation. Layout + content
</commit_message>
<xml_diff>
--- a/2nd_sem/daps/grill_murrent_lehner/DAPS.pptx
+++ b/2nd_sem/daps/grill_murrent_lehner/DAPS.pptx
@@ -3556,6 +3556,9 @@
           <a:bodyPr/>
           <a:lstStyle/>
           <a:p>
+            <a:endParaRPr lang="de-AT" dirty="0" smtClean="0"/>
+          </a:p>
+          <a:p>
             <a:r>
               <a:rPr lang="de-AT" dirty="0" smtClean="0"/>
               <a:t>C2C </a:t>
@@ -3567,6 +3570,9 @@
             <a:endParaRPr lang="de-AT" dirty="0" smtClean="0"/>
           </a:p>
           <a:p>
+            <a:endParaRPr lang="de-AT" dirty="0" smtClean="0"/>
+          </a:p>
+          <a:p>
             <a:r>
               <a:rPr lang="de-AT" dirty="0" smtClean="0"/>
               <a:t>Connection </a:t>
@@ -3599,6 +3605,9 @@
               <a:rPr lang="de-AT" dirty="0" err="1" smtClean="0"/>
               <a:t>infrastructure</a:t>
             </a:r>
+            <a:endParaRPr lang="de-AT" dirty="0" smtClean="0"/>
+          </a:p>
+          <a:p>
             <a:endParaRPr lang="de-AT" dirty="0" smtClean="0"/>
           </a:p>
           <a:p>
@@ -3689,70 +3698,79 @@
           <a:bodyPr/>
           <a:lstStyle/>
           <a:p>
-            <a:r>
-              <a:rPr lang="de-AT" b="1" dirty="0" err="1"/>
+            <a:endParaRPr lang="de-AT" dirty="0" smtClean="0"/>
+          </a:p>
+          <a:p>
+            <a:r>
+              <a:rPr lang="de-AT" dirty="0" err="1" smtClean="0"/>
               <a:t>Cooperative</a:t>
             </a:r>
             <a:r>
-              <a:rPr lang="de-AT" b="1" dirty="0"/>
+              <a:rPr lang="de-AT" dirty="0" smtClean="0"/>
               <a:t> </a:t>
             </a:r>
             <a:r>
-              <a:rPr lang="de-AT" b="1" dirty="0" err="1"/>
+              <a:rPr lang="de-AT" dirty="0" err="1"/>
               <a:t>forward</a:t>
             </a:r>
             <a:r>
-              <a:rPr lang="de-AT" b="1" dirty="0"/>
+              <a:rPr lang="de-AT" dirty="0"/>
               <a:t> </a:t>
             </a:r>
             <a:r>
-              <a:rPr lang="de-AT" b="1" dirty="0" err="1"/>
+              <a:rPr lang="de-AT" dirty="0" err="1"/>
               <a:t>collision</a:t>
             </a:r>
             <a:r>
-              <a:rPr lang="de-AT" b="1" dirty="0"/>
+              <a:rPr lang="de-AT" dirty="0"/>
               <a:t> </a:t>
             </a:r>
             <a:r>
-              <a:rPr lang="de-AT" b="1" dirty="0" err="1" smtClean="0"/>
+              <a:rPr lang="de-AT" dirty="0" err="1" smtClean="0"/>
               <a:t>warning</a:t>
             </a:r>
-            <a:endParaRPr lang="de-AT" b="1" dirty="0" smtClean="0"/>
-          </a:p>
-          <a:p>
-            <a:r>
-              <a:rPr lang="de-AT" b="1" dirty="0" err="1"/>
+            <a:endParaRPr lang="de-AT" dirty="0" smtClean="0"/>
+          </a:p>
+          <a:p>
+            <a:endParaRPr lang="de-AT" dirty="0" smtClean="0"/>
+          </a:p>
+          <a:p>
+            <a:r>
+              <a:rPr lang="de-AT" dirty="0" err="1"/>
               <a:t>Pre</a:t>
             </a:r>
             <a:r>
-              <a:rPr lang="de-AT" b="1" dirty="0"/>
+              <a:rPr lang="de-AT" dirty="0"/>
               <a:t>-crash </a:t>
             </a:r>
             <a:r>
-              <a:rPr lang="de-AT" b="1" dirty="0" err="1" smtClean="0"/>
+              <a:rPr lang="de-AT" dirty="0" err="1" smtClean="0"/>
               <a:t>Sensing</a:t>
             </a:r>
             <a:r>
-              <a:rPr lang="de-AT" b="1" dirty="0" smtClean="0"/>
+              <a:rPr lang="de-AT" dirty="0" smtClean="0"/>
               <a:t>/</a:t>
             </a:r>
             <a:r>
-              <a:rPr lang="de-AT" b="1" dirty="0" err="1" smtClean="0"/>
+              <a:rPr lang="de-AT" dirty="0" err="1" smtClean="0"/>
               <a:t>Warning</a:t>
             </a:r>
-            <a:endParaRPr lang="de-AT" b="1" dirty="0" smtClean="0"/>
-          </a:p>
-          <a:p>
-            <a:r>
-              <a:rPr lang="de-AT" b="1" dirty="0" err="1"/>
+            <a:endParaRPr lang="de-AT" dirty="0" smtClean="0"/>
+          </a:p>
+          <a:p>
+            <a:endParaRPr lang="de-AT" dirty="0" smtClean="0"/>
+          </a:p>
+          <a:p>
+            <a:r>
+              <a:rPr lang="de-AT" dirty="0" err="1"/>
               <a:t>Hazardous</a:t>
             </a:r>
             <a:r>
-              <a:rPr lang="de-AT" b="1" dirty="0"/>
+              <a:rPr lang="de-AT" dirty="0"/>
               <a:t> Location </a:t>
             </a:r>
             <a:r>
-              <a:rPr lang="de-AT" b="1" dirty="0" err="1"/>
+              <a:rPr lang="de-AT" dirty="0" err="1"/>
               <a:t>Notification</a:t>
             </a:r>
             <a:endParaRPr lang="de-AT" dirty="0"/>
@@ -3834,35 +3852,47 @@
           <a:bodyPr/>
           <a:lstStyle/>
           <a:p>
-            <a:r>
-              <a:rPr lang="en-US" b="1" dirty="0"/>
-              <a:t>Enhanced route guidance and </a:t>
-            </a:r>
-            <a:r>
-              <a:rPr lang="en-US" b="1" dirty="0" smtClean="0"/>
+            <a:endParaRPr lang="en-US" dirty="0" smtClean="0"/>
+          </a:p>
+          <a:p>
+            <a:r>
+              <a:rPr lang="en-US" dirty="0" smtClean="0"/>
+              <a:t>Enhanced </a:t>
+            </a:r>
+            <a:r>
+              <a:rPr lang="en-US" dirty="0"/>
+              <a:t>route guidance and </a:t>
+            </a:r>
+            <a:r>
+              <a:rPr lang="en-US" dirty="0" smtClean="0"/>
               <a:t>navigation</a:t>
             </a:r>
           </a:p>
           <a:p>
-            <a:r>
-              <a:rPr lang="en-US" b="1" dirty="0"/>
+            <a:endParaRPr lang="en-US" dirty="0" smtClean="0"/>
+          </a:p>
+          <a:p>
+            <a:r>
+              <a:rPr lang="en-US" dirty="0"/>
               <a:t>Green light optimal speed </a:t>
             </a:r>
             <a:r>
-              <a:rPr lang="en-US" b="1" dirty="0" smtClean="0"/>
+              <a:rPr lang="en-US" dirty="0" smtClean="0"/>
               <a:t>advisory</a:t>
             </a:r>
           </a:p>
           <a:p>
-            <a:r>
-              <a:rPr lang="de-AT" b="1" dirty="0" err="1"/>
+            <a:endParaRPr lang="en-US" dirty="0" smtClean="0"/>
+          </a:p>
+          <a:p>
+            <a:r>
+              <a:rPr lang="de-AT" dirty="0" err="1"/>
               <a:t>Merging</a:t>
             </a:r>
             <a:r>
-              <a:rPr lang="de-AT" b="1" dirty="0"/>
+              <a:rPr lang="de-AT" dirty="0"/>
               <a:t> Assistance</a:t>
             </a:r>
-            <a:endParaRPr lang="de-AT" dirty="0"/>
           </a:p>
         </p:txBody>
       </p:sp>
@@ -3941,58 +3971,67 @@
           <a:bodyPr/>
           <a:lstStyle/>
           <a:p>
-            <a:r>
-              <a:rPr lang="de-AT" b="1" dirty="0"/>
+            <a:endParaRPr lang="de-AT" dirty="0" smtClean="0"/>
+          </a:p>
+          <a:p>
+            <a:r>
+              <a:rPr lang="de-AT" dirty="0" smtClean="0"/>
               <a:t>Internet </a:t>
             </a:r>
             <a:r>
-              <a:rPr lang="de-AT" b="1" dirty="0" err="1"/>
+              <a:rPr lang="de-AT" dirty="0" err="1"/>
               <a:t>access</a:t>
             </a:r>
             <a:r>
-              <a:rPr lang="de-AT" b="1" dirty="0"/>
+              <a:rPr lang="de-AT" dirty="0"/>
               <a:t> in </a:t>
             </a:r>
             <a:r>
-              <a:rPr lang="de-AT" b="1" dirty="0" err="1" smtClean="0"/>
+              <a:rPr lang="de-AT" dirty="0" err="1" smtClean="0"/>
               <a:t>vehicle</a:t>
             </a:r>
-            <a:endParaRPr lang="de-AT" b="1" dirty="0" smtClean="0"/>
-          </a:p>
-          <a:p>
-            <a:r>
-              <a:rPr lang="de-AT" b="1" dirty="0"/>
+            <a:endParaRPr lang="de-AT" dirty="0" smtClean="0"/>
+          </a:p>
+          <a:p>
+            <a:endParaRPr lang="de-AT" dirty="0" smtClean="0"/>
+          </a:p>
+          <a:p>
+            <a:r>
+              <a:rPr lang="de-AT" dirty="0"/>
               <a:t>Point </a:t>
             </a:r>
             <a:r>
-              <a:rPr lang="de-AT" b="1" dirty="0" err="1"/>
+              <a:rPr lang="de-AT" dirty="0" err="1"/>
               <a:t>of</a:t>
             </a:r>
             <a:r>
-              <a:rPr lang="de-AT" b="1" dirty="0"/>
+              <a:rPr lang="de-AT" dirty="0"/>
               <a:t> </a:t>
             </a:r>
             <a:r>
-              <a:rPr lang="de-AT" b="1" dirty="0" err="1"/>
+              <a:rPr lang="de-AT" dirty="0" err="1"/>
               <a:t>interest</a:t>
             </a:r>
             <a:r>
-              <a:rPr lang="de-AT" b="1" dirty="0"/>
+              <a:rPr lang="de-AT" dirty="0"/>
               <a:t> </a:t>
             </a:r>
             <a:r>
-              <a:rPr lang="de-AT" b="1" dirty="0" err="1" smtClean="0"/>
+              <a:rPr lang="de-AT" dirty="0" err="1" smtClean="0"/>
               <a:t>information</a:t>
             </a:r>
-            <a:endParaRPr lang="de-AT" b="1" dirty="0"/>
-          </a:p>
-          <a:p>
-            <a:r>
-              <a:rPr lang="de-AT" b="1" dirty="0"/>
+            <a:endParaRPr lang="de-AT" dirty="0" smtClean="0"/>
+          </a:p>
+          <a:p>
+            <a:endParaRPr lang="de-AT" dirty="0"/>
+          </a:p>
+          <a:p>
+            <a:r>
+              <a:rPr lang="de-AT" dirty="0"/>
               <a:t>Remote </a:t>
             </a:r>
             <a:r>
-              <a:rPr lang="de-AT" b="1" dirty="0" err="1" smtClean="0"/>
+              <a:rPr lang="de-AT" dirty="0" err="1" smtClean="0"/>
               <a:t>Diagnostics</a:t>
             </a:r>
             <a:endParaRPr lang="de-AT" dirty="0"/>
@@ -5095,7 +5134,7 @@
             </a:r>
             <a:r>
               <a:rPr lang="de-AT" dirty="0" err="1" smtClean="0"/>
-              <a:t>Rasbian</a:t>
+              <a:t>Raspbian</a:t>
             </a:r>
             <a:r>
               <a:rPr lang="de-AT" dirty="0" smtClean="0"/>
@@ -5107,24 +5146,16 @@
             <a:pPr lvl="1"/>
             <a:r>
               <a:rPr lang="de-AT" dirty="0" smtClean="0"/>
-              <a:t>TP-Link </a:t>
-            </a:r>
+              <a:t>TP-Link Nano TL-WN725N</a:t>
+            </a:r>
+          </a:p>
+          <a:p>
+            <a:endParaRPr lang="de-AT" dirty="0"/>
+          </a:p>
+          <a:p>
             <a:r>
               <a:rPr lang="de-AT" dirty="0" smtClean="0"/>
-              <a:t>Nano TL-WN725N</a:t>
-            </a:r>
-          </a:p>
-          <a:p>
-            <a:endParaRPr lang="de-AT" dirty="0"/>
-          </a:p>
-          <a:p>
-            <a:r>
-              <a:rPr lang="de-AT" dirty="0" smtClean="0"/>
-              <a:t>Android 4.4/ </a:t>
-            </a:r>
-            <a:r>
-              <a:rPr lang="de-AT" dirty="0" smtClean="0"/>
-              <a:t>4.2</a:t>
+              <a:t>Android 4.4/ 4.2</a:t>
             </a:r>
           </a:p>
           <a:p>
@@ -5135,7 +5166,6 @@
               <a:rPr lang="de-AT" dirty="0" smtClean="0"/>
               <a:t>Windows Phone</a:t>
             </a:r>
-            <a:endParaRPr lang="de-AT" dirty="0" smtClean="0"/>
           </a:p>
           <a:p>
             <a:endParaRPr lang="de-AT" dirty="0"/>

</xml_diff>